<commit_message>
Fix some analysis plots, add conclusion slide to presentation (empty, to be filled)
</commit_message>
<xml_diff>
--- a/doc/20230711_ImmoEliza_DataAnalysis_pres.pptx
+++ b/doc/20230711_ImmoEliza_DataAnalysis_pres.pptx
@@ -5,14 +5,15 @@
     <p:sldMasterId id="2147483648" r:id="rId1"/>
   </p:sldMasterIdLst>
   <p:notesMasterIdLst>
-    <p:notesMasterId r:id="rId7"/>
+    <p:notesMasterId r:id="rId8"/>
   </p:notesMasterIdLst>
   <p:sldIdLst>
     <p:sldId id="269" r:id="rId2"/>
     <p:sldId id="275" r:id="rId3"/>
     <p:sldId id="276" r:id="rId4"/>
     <p:sldId id="277" r:id="rId5"/>
-    <p:sldId id="273" r:id="rId6"/>
+    <p:sldId id="278" r:id="rId6"/>
+    <p:sldId id="273" r:id="rId7"/>
   </p:sldIdLst>
   <p:sldSz cx="12192000" cy="6858000"/>
   <p:notesSz cx="6858000" cy="9144000"/>
@@ -1807,7 +1808,7 @@
           <a:p>
             <a:fld id="{3A3E5F92-3B5F-4896-A548-44E8A7ADCD45}" type="datetime8">
               <a:rPr lang="en-BE" smtClean="0"/>
-              <a:t>11/07/2023 12:18</a:t>
+              <a:t>11/07/2023 18:21</a:t>
             </a:fld>
             <a:endParaRPr lang="en-BE"/>
           </a:p>
@@ -2007,7 +2008,7 @@
           <a:p>
             <a:fld id="{CE02C9C0-2C7F-4CB9-BEE4-E7F8ECE1DFEE}" type="datetime8">
               <a:rPr lang="en-BE" smtClean="0"/>
-              <a:t>11/07/2023 12:18</a:t>
+              <a:t>11/07/2023 18:21</a:t>
             </a:fld>
             <a:endParaRPr lang="en-BE"/>
           </a:p>
@@ -2217,7 +2218,7 @@
           <a:p>
             <a:fld id="{8BC7D0ED-DDA8-43D2-8D61-1E6CECAE74DB}" type="datetime8">
               <a:rPr lang="en-BE" smtClean="0"/>
-              <a:t>11/07/2023 12:18</a:t>
+              <a:t>11/07/2023 18:21</a:t>
             </a:fld>
             <a:endParaRPr lang="en-BE"/>
           </a:p>
@@ -2417,7 +2418,7 @@
           <a:p>
             <a:fld id="{1B66BC60-3275-4E3F-AE3E-41BE5EBF165B}" type="datetime8">
               <a:rPr lang="en-BE" smtClean="0"/>
-              <a:t>11/07/2023 12:18</a:t>
+              <a:t>11/07/2023 18:21</a:t>
             </a:fld>
             <a:endParaRPr lang="en-BE"/>
           </a:p>
@@ -2693,7 +2694,7 @@
           <a:p>
             <a:fld id="{C33DBC0A-F5C4-44C9-B372-0E90AF304FC2}" type="datetime8">
               <a:rPr lang="en-BE" smtClean="0"/>
-              <a:t>11/07/2023 12:18</a:t>
+              <a:t>11/07/2023 18:21</a:t>
             </a:fld>
             <a:endParaRPr lang="en-BE"/>
           </a:p>
@@ -2961,7 +2962,7 @@
           <a:p>
             <a:fld id="{416A31C1-DA76-4D09-9137-31C5C2B1CE8D}" type="datetime8">
               <a:rPr lang="en-BE" smtClean="0"/>
-              <a:t>11/07/2023 12:18</a:t>
+              <a:t>11/07/2023 18:21</a:t>
             </a:fld>
             <a:endParaRPr lang="en-BE"/>
           </a:p>
@@ -3376,7 +3377,7 @@
           <a:p>
             <a:fld id="{4C1F5C20-970A-477C-939C-788885007771}" type="datetime8">
               <a:rPr lang="en-BE" smtClean="0"/>
-              <a:t>11/07/2023 12:18</a:t>
+              <a:t>11/07/2023 18:21</a:t>
             </a:fld>
             <a:endParaRPr lang="en-BE"/>
           </a:p>
@@ -3518,7 +3519,7 @@
           <a:p>
             <a:fld id="{4D725E21-802A-493E-A0F8-68BB845CCCAE}" type="datetime8">
               <a:rPr lang="en-BE" smtClean="0"/>
-              <a:t>11/07/2023 12:18</a:t>
+              <a:t>11/07/2023 18:21</a:t>
             </a:fld>
             <a:endParaRPr lang="en-BE"/>
           </a:p>
@@ -3631,7 +3632,7 @@
           <a:p>
             <a:fld id="{A5731415-03FD-4E5F-8951-DDA776DF7EF7}" type="datetime8">
               <a:rPr lang="en-BE" smtClean="0"/>
-              <a:t>11/07/2023 12:18</a:t>
+              <a:t>11/07/2023 18:21</a:t>
             </a:fld>
             <a:endParaRPr lang="en-BE"/>
           </a:p>
@@ -3944,7 +3945,7 @@
           <a:p>
             <a:fld id="{E33E6410-8873-43F2-99EB-5857EAD8B7EC}" type="datetime8">
               <a:rPr lang="en-BE" smtClean="0"/>
-              <a:t>11/07/2023 12:18</a:t>
+              <a:t>11/07/2023 18:21</a:t>
             </a:fld>
             <a:endParaRPr lang="en-BE"/>
           </a:p>
@@ -4233,7 +4234,7 @@
           <a:p>
             <a:fld id="{725EC132-D24E-4F05-A232-9A629FBC28BA}" type="datetime8">
               <a:rPr lang="en-BE" smtClean="0"/>
-              <a:t>11/07/2023 12:18</a:t>
+              <a:t>11/07/2023 18:21</a:t>
             </a:fld>
             <a:endParaRPr lang="en-BE"/>
           </a:p>
@@ -4476,7 +4477,7 @@
           <a:p>
             <a:fld id="{D046FFB0-EB01-4F26-BED6-E90EBC9FCF5B}" type="datetime8">
               <a:rPr lang="en-BE" smtClean="0"/>
-              <a:t>11/07/2023 12:18</a:t>
+              <a:t>11/07/2023 18:21</a:t>
             </a:fld>
             <a:endParaRPr lang="en-BE"/>
           </a:p>
@@ -5593,6 +5594,18 @@
                   </a:schemeClr>
                 </a:solidFill>
               </a:rPr>
+              <a:t>Can it be really significant?</a:t>
+            </a:r>
+          </a:p>
+          <a:p>
+            <a:r>
+              <a:rPr lang="en-US" sz="2400" dirty="0">
+                <a:solidFill>
+                  <a:schemeClr val="bg2">
+                    <a:lumMod val="25000"/>
+                  </a:schemeClr>
+                </a:solidFill>
+              </a:rPr>
               <a:t>Can data help to prove this hypothesis?</a:t>
             </a:r>
             <a:endParaRPr lang="en-BE" sz="2400" dirty="0">
@@ -5633,8 +5646,8 @@
         </p:blipFill>
         <p:spPr>
           <a:xfrm>
-            <a:off x="7225012" y="1163308"/>
-            <a:ext cx="4693636" cy="5013656"/>
+            <a:off x="6787055" y="1096304"/>
+            <a:ext cx="4976477" cy="5138957"/>
           </a:xfrm>
           <a:prstGeom prst="rect">
             <a:avLst/>
@@ -6138,6 +6151,479 @@
       </p:grpSpPr>
       <p:sp>
         <p:nvSpPr>
+          <p:cNvPr id="3" name="Slide Number Placeholder 1">
+            <a:extLst>
+              <a:ext uri="{FF2B5EF4-FFF2-40B4-BE49-F238E27FC236}">
+                <a16:creationId xmlns:a16="http://schemas.microsoft.com/office/drawing/2014/main" id="{3C3DDF1E-6212-E857-8814-B341D2EE998C}"/>
+              </a:ext>
+            </a:extLst>
+          </p:cNvPr>
+          <p:cNvSpPr>
+            <a:spLocks noGrp="1"/>
+          </p:cNvSpPr>
+          <p:nvPr>
+            <p:ph type="sldNum" sz="quarter" idx="12"/>
+          </p:nvPr>
+        </p:nvSpPr>
+        <p:spPr>
+          <a:xfrm>
+            <a:off x="11307816" y="6368176"/>
+            <a:ext cx="756746" cy="359760"/>
+          </a:xfrm>
+        </p:spPr>
+        <p:txBody>
+          <a:bodyPr/>
+          <a:lstStyle/>
+          <a:p>
+            <a:pPr marL="0" marR="0" lvl="0" indent="0" algn="ctr" defTabSz="914400" rtl="0" eaLnBrk="1" fontAlgn="auto" latinLnBrk="0" hangingPunct="1">
+              <a:lnSpc>
+                <a:spcPct val="100000"/>
+              </a:lnSpc>
+              <a:spcBef>
+                <a:spcPts val="0"/>
+              </a:spcBef>
+              <a:spcAft>
+                <a:spcPts val="0"/>
+              </a:spcAft>
+              <a:buClrTx/>
+              <a:buSzTx/>
+              <a:buFontTx/>
+              <a:buNone/>
+              <a:tabLst/>
+              <a:defRPr/>
+            </a:pPr>
+            <a:fld id="{89AD5A1C-A7E3-484B-8C88-95C064AC22E4}" type="slidenum">
+              <a:rPr kumimoji="0" lang="en-BE" sz="2000" b="1" i="0" u="none" strike="noStrike" kern="1200" cap="none" spc="0" normalizeH="0" baseline="0" noProof="0" smtClean="0">
+                <a:ln>
+                  <a:noFill/>
+                </a:ln>
+                <a:solidFill>
+                  <a:srgbClr val="288284"/>
+                </a:solidFill>
+                <a:effectLst/>
+                <a:uLnTx/>
+                <a:uFillTx/>
+                <a:latin typeface="Calibri" panose="020F0502020204030204"/>
+                <a:ea typeface="+mn-ea"/>
+                <a:cs typeface="+mn-cs"/>
+              </a:rPr>
+              <a:pPr marL="0" marR="0" lvl="0" indent="0" algn="ctr" defTabSz="914400" rtl="0" eaLnBrk="1" fontAlgn="auto" latinLnBrk="0" hangingPunct="1">
+                <a:lnSpc>
+                  <a:spcPct val="100000"/>
+                </a:lnSpc>
+                <a:spcBef>
+                  <a:spcPts val="0"/>
+                </a:spcBef>
+                <a:spcAft>
+                  <a:spcPts val="0"/>
+                </a:spcAft>
+                <a:buClrTx/>
+                <a:buSzTx/>
+                <a:buFontTx/>
+                <a:buNone/>
+                <a:tabLst/>
+                <a:defRPr/>
+              </a:pPr>
+              <a:t>5</a:t>
+            </a:fld>
+            <a:endParaRPr kumimoji="0" lang="en-BE" sz="2000" b="1" i="0" u="none" strike="noStrike" kern="1200" cap="none" spc="0" normalizeH="0" baseline="0" noProof="0" dirty="0">
+              <a:ln>
+                <a:noFill/>
+              </a:ln>
+              <a:solidFill>
+                <a:srgbClr val="288284"/>
+              </a:solidFill>
+              <a:effectLst/>
+              <a:uLnTx/>
+              <a:uFillTx/>
+              <a:latin typeface="Calibri" panose="020F0502020204030204"/>
+              <a:ea typeface="+mn-ea"/>
+              <a:cs typeface="+mn-cs"/>
+            </a:endParaRPr>
+          </a:p>
+        </p:txBody>
+      </p:sp>
+      <p:sp>
+        <p:nvSpPr>
+          <p:cNvPr id="7" name="Title 6">
+            <a:extLst>
+              <a:ext uri="{FF2B5EF4-FFF2-40B4-BE49-F238E27FC236}">
+                <a16:creationId xmlns:a16="http://schemas.microsoft.com/office/drawing/2014/main" id="{2796D9AB-0532-A7B7-89F0-ADA0EC8C81C8}"/>
+              </a:ext>
+            </a:extLst>
+          </p:cNvPr>
+          <p:cNvSpPr txBox="1">
+            <a:spLocks/>
+          </p:cNvSpPr>
+          <p:nvPr/>
+        </p:nvSpPr>
+        <p:spPr>
+          <a:xfrm>
+            <a:off x="1303283" y="433552"/>
+            <a:ext cx="10515600" cy="579382"/>
+          </a:xfrm>
+          <a:prstGeom prst="rect">
+            <a:avLst/>
+          </a:prstGeom>
+        </p:spPr>
+        <p:txBody>
+          <a:bodyPr>
+            <a:normAutofit fontScale="92500" lnSpcReduction="10000"/>
+          </a:bodyPr>
+          <a:lstStyle>
+            <a:lvl1pPr algn="l" defTabSz="914400" rtl="0" eaLnBrk="1" latinLnBrk="0" hangingPunct="1">
+              <a:lnSpc>
+                <a:spcPct val="90000"/>
+              </a:lnSpc>
+              <a:spcBef>
+                <a:spcPct val="0"/>
+              </a:spcBef>
+              <a:buNone/>
+              <a:defRPr sz="4400" kern="1200">
+                <a:solidFill>
+                  <a:schemeClr val="tx1"/>
+                </a:solidFill>
+                <a:latin typeface="+mj-lt"/>
+                <a:ea typeface="+mj-ea"/>
+                <a:cs typeface="+mj-cs"/>
+              </a:defRPr>
+            </a:lvl1pPr>
+          </a:lstStyle>
+          <a:p>
+            <a:pPr marL="0" marR="0" lvl="0" indent="0" algn="r" defTabSz="914400" rtl="0" eaLnBrk="1" fontAlgn="auto" latinLnBrk="0" hangingPunct="1">
+              <a:lnSpc>
+                <a:spcPct val="90000"/>
+              </a:lnSpc>
+              <a:spcBef>
+                <a:spcPct val="0"/>
+              </a:spcBef>
+              <a:spcAft>
+                <a:spcPts val="0"/>
+              </a:spcAft>
+              <a:buClrTx/>
+              <a:buSzTx/>
+              <a:buFontTx/>
+              <a:buNone/>
+              <a:tabLst/>
+              <a:defRPr/>
+            </a:pPr>
+            <a:r>
+              <a:rPr kumimoji="0" lang="en-US" sz="4000" b="1" i="0" u="none" strike="noStrike" kern="1200" cap="none" spc="0" normalizeH="0" baseline="0" noProof="0" dirty="0">
+                <a:ln>
+                  <a:noFill/>
+                </a:ln>
+                <a:solidFill>
+                  <a:srgbClr val="288284"/>
+                </a:solidFill>
+                <a:effectLst/>
+                <a:uLnTx/>
+                <a:uFillTx/>
+                <a:latin typeface="Calibri Light" panose="020F0302020204030204"/>
+                <a:ea typeface="+mj-ea"/>
+                <a:cs typeface="+mj-cs"/>
+              </a:rPr>
+              <a:t>Conclusion</a:t>
+            </a:r>
+            <a:endParaRPr kumimoji="0" lang="en-BE" sz="4000" b="1" i="0" u="none" strike="noStrike" kern="1200" cap="none" spc="0" normalizeH="0" baseline="0" noProof="0" dirty="0">
+              <a:ln>
+                <a:noFill/>
+              </a:ln>
+              <a:solidFill>
+                <a:srgbClr val="288284"/>
+              </a:solidFill>
+              <a:effectLst/>
+              <a:uLnTx/>
+              <a:uFillTx/>
+              <a:latin typeface="Calibri Light" panose="020F0302020204030204"/>
+              <a:ea typeface="+mj-ea"/>
+              <a:cs typeface="+mj-cs"/>
+            </a:endParaRPr>
+          </a:p>
+        </p:txBody>
+      </p:sp>
+      <p:sp>
+        <p:nvSpPr>
+          <p:cNvPr id="8" name="Content Placeholder 7">
+            <a:extLst>
+              <a:ext uri="{FF2B5EF4-FFF2-40B4-BE49-F238E27FC236}">
+                <a16:creationId xmlns:a16="http://schemas.microsoft.com/office/drawing/2014/main" id="{9969D63C-D951-D12F-655E-3E30A1020985}"/>
+              </a:ext>
+            </a:extLst>
+          </p:cNvPr>
+          <p:cNvSpPr txBox="1">
+            <a:spLocks/>
+          </p:cNvSpPr>
+          <p:nvPr/>
+        </p:nvSpPr>
+        <p:spPr>
+          <a:xfrm>
+            <a:off x="298232" y="1277008"/>
+            <a:ext cx="6654362" cy="4899956"/>
+          </a:xfrm>
+          <a:prstGeom prst="rect">
+            <a:avLst/>
+          </a:prstGeom>
+        </p:spPr>
+        <p:txBody>
+          <a:bodyPr/>
+          <a:lstStyle>
+            <a:lvl1pPr marL="228600" indent="-228600" algn="l" defTabSz="914400" rtl="0" eaLnBrk="1" latinLnBrk="0" hangingPunct="1">
+              <a:lnSpc>
+                <a:spcPct val="90000"/>
+              </a:lnSpc>
+              <a:spcBef>
+                <a:spcPts val="1000"/>
+              </a:spcBef>
+              <a:buFont typeface="Arial" panose="020B0604020202020204" pitchFamily="34" charset="0"/>
+              <a:buChar char="•"/>
+              <a:defRPr sz="2800" kern="1200">
+                <a:solidFill>
+                  <a:schemeClr val="tx1"/>
+                </a:solidFill>
+                <a:latin typeface="+mn-lt"/>
+                <a:ea typeface="+mn-ea"/>
+                <a:cs typeface="+mn-cs"/>
+              </a:defRPr>
+            </a:lvl1pPr>
+            <a:lvl2pPr marL="685800" indent="-228600" algn="l" defTabSz="914400" rtl="0" eaLnBrk="1" latinLnBrk="0" hangingPunct="1">
+              <a:lnSpc>
+                <a:spcPct val="90000"/>
+              </a:lnSpc>
+              <a:spcBef>
+                <a:spcPts val="500"/>
+              </a:spcBef>
+              <a:buFont typeface="Arial" panose="020B0604020202020204" pitchFamily="34" charset="0"/>
+              <a:buChar char="•"/>
+              <a:defRPr sz="2400" kern="1200">
+                <a:solidFill>
+                  <a:schemeClr val="tx1"/>
+                </a:solidFill>
+                <a:latin typeface="+mn-lt"/>
+                <a:ea typeface="+mn-ea"/>
+                <a:cs typeface="+mn-cs"/>
+              </a:defRPr>
+            </a:lvl2pPr>
+            <a:lvl3pPr marL="1143000" indent="-228600" algn="l" defTabSz="914400" rtl="0" eaLnBrk="1" latinLnBrk="0" hangingPunct="1">
+              <a:lnSpc>
+                <a:spcPct val="90000"/>
+              </a:lnSpc>
+              <a:spcBef>
+                <a:spcPts val="500"/>
+              </a:spcBef>
+              <a:buFont typeface="Arial" panose="020B0604020202020204" pitchFamily="34" charset="0"/>
+              <a:buChar char="•"/>
+              <a:defRPr sz="2000" kern="1200">
+                <a:solidFill>
+                  <a:schemeClr val="tx1"/>
+                </a:solidFill>
+                <a:latin typeface="+mn-lt"/>
+                <a:ea typeface="+mn-ea"/>
+                <a:cs typeface="+mn-cs"/>
+              </a:defRPr>
+            </a:lvl3pPr>
+            <a:lvl4pPr marL="1600200" indent="-228600" algn="l" defTabSz="914400" rtl="0" eaLnBrk="1" latinLnBrk="0" hangingPunct="1">
+              <a:lnSpc>
+                <a:spcPct val="90000"/>
+              </a:lnSpc>
+              <a:spcBef>
+                <a:spcPts val="500"/>
+              </a:spcBef>
+              <a:buFont typeface="Arial" panose="020B0604020202020204" pitchFamily="34" charset="0"/>
+              <a:buChar char="•"/>
+              <a:defRPr sz="1800" kern="1200">
+                <a:solidFill>
+                  <a:schemeClr val="tx1"/>
+                </a:solidFill>
+                <a:latin typeface="+mn-lt"/>
+                <a:ea typeface="+mn-ea"/>
+                <a:cs typeface="+mn-cs"/>
+              </a:defRPr>
+            </a:lvl4pPr>
+            <a:lvl5pPr marL="2057400" indent="-228600" algn="l" defTabSz="914400" rtl="0" eaLnBrk="1" latinLnBrk="0" hangingPunct="1">
+              <a:lnSpc>
+                <a:spcPct val="90000"/>
+              </a:lnSpc>
+              <a:spcBef>
+                <a:spcPts val="500"/>
+              </a:spcBef>
+              <a:buFont typeface="Arial" panose="020B0604020202020204" pitchFamily="34" charset="0"/>
+              <a:buChar char="•"/>
+              <a:defRPr sz="1800" kern="1200">
+                <a:solidFill>
+                  <a:schemeClr val="tx1"/>
+                </a:solidFill>
+                <a:latin typeface="+mn-lt"/>
+                <a:ea typeface="+mn-ea"/>
+                <a:cs typeface="+mn-cs"/>
+              </a:defRPr>
+            </a:lvl5pPr>
+            <a:lvl6pPr marL="2514600" indent="-228600" algn="l" defTabSz="914400" rtl="0" eaLnBrk="1" latinLnBrk="0" hangingPunct="1">
+              <a:lnSpc>
+                <a:spcPct val="90000"/>
+              </a:lnSpc>
+              <a:spcBef>
+                <a:spcPts val="500"/>
+              </a:spcBef>
+              <a:buFont typeface="Arial" panose="020B0604020202020204" pitchFamily="34" charset="0"/>
+              <a:buChar char="•"/>
+              <a:defRPr sz="1800" kern="1200">
+                <a:solidFill>
+                  <a:schemeClr val="tx1"/>
+                </a:solidFill>
+                <a:latin typeface="+mn-lt"/>
+                <a:ea typeface="+mn-ea"/>
+                <a:cs typeface="+mn-cs"/>
+              </a:defRPr>
+            </a:lvl6pPr>
+            <a:lvl7pPr marL="2971800" indent="-228600" algn="l" defTabSz="914400" rtl="0" eaLnBrk="1" latinLnBrk="0" hangingPunct="1">
+              <a:lnSpc>
+                <a:spcPct val="90000"/>
+              </a:lnSpc>
+              <a:spcBef>
+                <a:spcPts val="500"/>
+              </a:spcBef>
+              <a:buFont typeface="Arial" panose="020B0604020202020204" pitchFamily="34" charset="0"/>
+              <a:buChar char="•"/>
+              <a:defRPr sz="1800" kern="1200">
+                <a:solidFill>
+                  <a:schemeClr val="tx1"/>
+                </a:solidFill>
+                <a:latin typeface="+mn-lt"/>
+                <a:ea typeface="+mn-ea"/>
+                <a:cs typeface="+mn-cs"/>
+              </a:defRPr>
+            </a:lvl7pPr>
+            <a:lvl8pPr marL="3429000" indent="-228600" algn="l" defTabSz="914400" rtl="0" eaLnBrk="1" latinLnBrk="0" hangingPunct="1">
+              <a:lnSpc>
+                <a:spcPct val="90000"/>
+              </a:lnSpc>
+              <a:spcBef>
+                <a:spcPts val="500"/>
+              </a:spcBef>
+              <a:buFont typeface="Arial" panose="020B0604020202020204" pitchFamily="34" charset="0"/>
+              <a:buChar char="•"/>
+              <a:defRPr sz="1800" kern="1200">
+                <a:solidFill>
+                  <a:schemeClr val="tx1"/>
+                </a:solidFill>
+                <a:latin typeface="+mn-lt"/>
+                <a:ea typeface="+mn-ea"/>
+                <a:cs typeface="+mn-cs"/>
+              </a:defRPr>
+            </a:lvl8pPr>
+            <a:lvl9pPr marL="3886200" indent="-228600" algn="l" defTabSz="914400" rtl="0" eaLnBrk="1" latinLnBrk="0" hangingPunct="1">
+              <a:lnSpc>
+                <a:spcPct val="90000"/>
+              </a:lnSpc>
+              <a:spcBef>
+                <a:spcPts val="500"/>
+              </a:spcBef>
+              <a:buFont typeface="Arial" panose="020B0604020202020204" pitchFamily="34" charset="0"/>
+              <a:buChar char="•"/>
+              <a:defRPr sz="1800" kern="1200">
+                <a:solidFill>
+                  <a:schemeClr val="tx1"/>
+                </a:solidFill>
+                <a:latin typeface="+mn-lt"/>
+                <a:ea typeface="+mn-ea"/>
+                <a:cs typeface="+mn-cs"/>
+              </a:defRPr>
+            </a:lvl9pPr>
+          </a:lstStyle>
+          <a:p>
+            <a:pPr marL="228600" marR="0" lvl="0" indent="-228600" algn="l" defTabSz="914400" rtl="0" eaLnBrk="1" fontAlgn="auto" latinLnBrk="0" hangingPunct="1">
+              <a:lnSpc>
+                <a:spcPct val="90000"/>
+              </a:lnSpc>
+              <a:spcBef>
+                <a:spcPts val="1000"/>
+              </a:spcBef>
+              <a:spcAft>
+                <a:spcPts val="0"/>
+              </a:spcAft>
+              <a:buClrTx/>
+              <a:buSzTx/>
+              <a:buFont typeface="Arial" panose="020B0604020202020204" pitchFamily="34" charset="0"/>
+              <a:buChar char="•"/>
+              <a:tabLst/>
+              <a:defRPr/>
+            </a:pPr>
+            <a:r>
+              <a:rPr lang="en-US" sz="2400" dirty="0">
+                <a:solidFill>
+                  <a:srgbClr val="E7E6E6">
+                    <a:lumMod val="25000"/>
+                  </a:srgbClr>
+                </a:solidFill>
+                <a:latin typeface="Calibri" panose="020F0502020204030204"/>
+              </a:rPr>
+              <a:t>xxx</a:t>
+            </a:r>
+            <a:endParaRPr kumimoji="0" lang="en-BE" sz="2400" b="0" i="0" u="none" strike="noStrike" kern="1200" cap="none" spc="0" normalizeH="0" baseline="0" noProof="0" dirty="0">
+              <a:ln>
+                <a:noFill/>
+              </a:ln>
+              <a:solidFill>
+                <a:srgbClr val="E7E6E6">
+                  <a:lumMod val="25000"/>
+                </a:srgbClr>
+              </a:solidFill>
+              <a:effectLst/>
+              <a:uLnTx/>
+              <a:uFillTx/>
+              <a:latin typeface="Calibri" panose="020F0502020204030204"/>
+              <a:ea typeface="+mn-ea"/>
+              <a:cs typeface="+mn-cs"/>
+            </a:endParaRPr>
+          </a:p>
+        </p:txBody>
+      </p:sp>
+    </p:spTree>
+    <p:extLst>
+      <p:ext uri="{BB962C8B-B14F-4D97-AF65-F5344CB8AC3E}">
+        <p14:creationId xmlns:p14="http://schemas.microsoft.com/office/powerpoint/2010/main" val="3827404082"/>
+      </p:ext>
+    </p:extLst>
+  </p:cSld>
+  <p:clrMapOvr>
+    <a:masterClrMapping/>
+  </p:clrMapOvr>
+</p:sld>
+</file>
+
+<file path=ppt/slides/slide6.xml><?xml version="1.0" encoding="utf-8"?>
+<p:sld xmlns:a="http://schemas.openxmlformats.org/drawingml/2006/main" xmlns:r="http://schemas.openxmlformats.org/officeDocument/2006/relationships" xmlns:p="http://schemas.openxmlformats.org/presentationml/2006/main">
+  <p:cSld>
+    <p:bg>
+      <p:bgPr>
+        <a:blipFill dpi="0" rotWithShape="1">
+          <a:blip r:embed="rId2">
+            <a:lum/>
+          </a:blip>
+          <a:srcRect/>
+          <a:stretch>
+            <a:fillRect/>
+          </a:stretch>
+        </a:blipFill>
+        <a:effectLst/>
+      </p:bgPr>
+    </p:bg>
+    <p:spTree>
+      <p:nvGrpSpPr>
+        <p:cNvPr id="1" name=""/>
+        <p:cNvGrpSpPr/>
+        <p:nvPr/>
+      </p:nvGrpSpPr>
+      <p:grpSpPr>
+        <a:xfrm>
+          <a:off x="0" y="0"/>
+          <a:ext cx="0" cy="0"/>
+          <a:chOff x="0" y="0"/>
+          <a:chExt cx="0" cy="0"/>
+        </a:xfrm>
+      </p:grpSpPr>
+      <p:sp>
+        <p:nvSpPr>
           <p:cNvPr id="2" name="Title 8">
             <a:extLst>
               <a:ext uri="{FF2B5EF4-FFF2-40B4-BE49-F238E27FC236}">
@@ -6234,7 +6720,7 @@
                 </a:solidFill>
               </a:rPr>
               <a:pPr algn="ctr"/>
-              <a:t>5</a:t>
+              <a:t>6</a:t>
             </a:fld>
             <a:endParaRPr lang="en-BE" sz="2000" b="1" dirty="0">
               <a:solidFill>

</xml_diff>